<commit_message>
added sent pics of alin nd daniel...didnt add stojs because it was to low qual, but gna call that foto agency again in 1 - 2 h and ask for the access codes -> will add the best pic of everyone then
</commit_message>
<xml_diff>
--- a/Presentation/Main_Presentation_03_06_15/Masterfolien_Praesentation_DA_AA.pptx
+++ b/Presentation/Main_Presentation_03_06_15/Masterfolien_Praesentation_DA_AA.pptx
@@ -198,7 +198,7 @@
           <a:p>
             <a:fld id="{339AEEC4-EBDD-4E8B-BA79-466827A02213}" type="datetimeFigureOut">
               <a:rPr lang="de-DE" smtClean="0"/>
-              <a:t>22.05.2015</a:t>
+              <a:t>26.05.2015</a:t>
             </a:fld>
             <a:endParaRPr lang="de-DE"/>
           </a:p>
@@ -3718,8 +3718,8 @@
         </p:blipFill>
         <p:spPr>
           <a:xfrm>
-            <a:off x="7928655" y="2921051"/>
-            <a:ext cx="1740408" cy="2438400"/>
+            <a:off x="7932257" y="2921051"/>
+            <a:ext cx="1736806" cy="2433354"/>
           </a:xfrm>
           <a:prstGeom prst="rect">
             <a:avLst/>
@@ -3844,7 +3844,7 @@
           <p:nvPr/>
         </p:nvPicPr>
         <p:blipFill>
-          <a:blip r:embed="rId6">
+          <a:blip r:embed="rId7" cstate="print">
             <a:extLst>
               <a:ext uri="{28A0092B-C50C-407E-A947-70E740481C1C}">
                 <a14:useLocalDpi xmlns:a14="http://schemas.microsoft.com/office/drawing/2010/main" val="0"/>
@@ -3857,8 +3857,8 @@
         </p:blipFill>
         <p:spPr>
           <a:xfrm>
-            <a:off x="5931412" y="3270047"/>
-            <a:ext cx="1740408" cy="1740408"/>
+            <a:off x="5935013" y="2921049"/>
+            <a:ext cx="1736807" cy="2433356"/>
           </a:xfrm>
           <a:prstGeom prst="rect">
             <a:avLst/>
@@ -3914,7 +3914,7 @@
           <p:nvPr/>
         </p:nvPicPr>
         <p:blipFill>
-          <a:blip r:embed="rId6">
+          <a:blip r:embed="rId8" cstate="print">
             <a:extLst>
               <a:ext uri="{28A0092B-C50C-407E-A947-70E740481C1C}">
                 <a14:useLocalDpi xmlns:a14="http://schemas.microsoft.com/office/drawing/2010/main" val="0"/>
@@ -3927,8 +3927,8 @@
         </p:blipFill>
         <p:spPr>
           <a:xfrm>
-            <a:off x="3962348" y="3282872"/>
-            <a:ext cx="1740408" cy="1740408"/>
+            <a:off x="3937771" y="2921051"/>
+            <a:ext cx="1736806" cy="2433354"/>
           </a:xfrm>
           <a:prstGeom prst="rect">
             <a:avLst/>
@@ -3984,7 +3984,7 @@
           <p:nvPr/>
         </p:nvPicPr>
         <p:blipFill>
-          <a:blip r:embed="rId7">
+          <a:blip r:embed="rId9">
             <a:extLst>
               <a:ext uri="{28A0092B-C50C-407E-A947-70E740481C1C}">
                 <a14:useLocalDpi xmlns:a14="http://schemas.microsoft.com/office/drawing/2010/main" val="0"/>

</xml_diff>

<commit_message>
presentation pics added finaly | will send our master a mail for an other pic of him
</commit_message>
<xml_diff>
--- a/Presentation/Main_Presentation_03_06_15/Masterfolien_Praesentation_DA_AA.pptx
+++ b/Presentation/Main_Presentation_03_06_15/Masterfolien_Praesentation_DA_AA.pptx
@@ -3775,7 +3775,7 @@
           <p:nvPr/>
         </p:nvPicPr>
         <p:blipFill>
-          <a:blip r:embed="rId6">
+          <a:blip r:embed="rId6" cstate="print">
             <a:extLst>
               <a:ext uri="{28A0092B-C50C-407E-A947-70E740481C1C}">
                 <a14:useLocalDpi xmlns:a14="http://schemas.microsoft.com/office/drawing/2010/main" val="0"/>
@@ -3788,8 +3788,8 @@
         </p:blipFill>
         <p:spPr>
           <a:xfrm>
-            <a:off x="9925897" y="3270047"/>
-            <a:ext cx="1740408" cy="1740408"/>
+            <a:off x="9929500" y="2955012"/>
+            <a:ext cx="1712565" cy="2399392"/>
           </a:xfrm>
           <a:prstGeom prst="rect">
             <a:avLst/>
@@ -3814,7 +3814,7 @@
         </p:nvSpPr>
         <p:spPr>
           <a:xfrm>
-            <a:off x="9891751" y="5354405"/>
+            <a:off x="9859021" y="5354405"/>
             <a:ext cx="1853521" cy="369332"/>
           </a:xfrm>
           <a:prstGeom prst="rect">
@@ -3857,8 +3857,8 @@
         </p:blipFill>
         <p:spPr>
           <a:xfrm>
-            <a:off x="5935013" y="2921049"/>
-            <a:ext cx="1736807" cy="2433356"/>
+            <a:off x="5935013" y="2921050"/>
+            <a:ext cx="1736807" cy="2433354"/>
           </a:xfrm>
           <a:prstGeom prst="rect">
             <a:avLst/>
@@ -3928,7 +3928,7 @@
         <p:spPr>
           <a:xfrm>
             <a:off x="3937771" y="2921051"/>
-            <a:ext cx="1736806" cy="2433354"/>
+            <a:ext cx="1736806" cy="2433353"/>
           </a:xfrm>
           <a:prstGeom prst="rect">
             <a:avLst/>

</xml_diff>

<commit_message>
yah stuff holt do
</commit_message>
<xml_diff>
--- a/Presentation/Main_Presentation_03_06_15/Masterfolien_Praesentation_DA_AA.pptx
+++ b/Presentation/Main_Presentation_03_06_15/Masterfolien_Praesentation_DA_AA.pptx
@@ -198,7 +198,7 @@
           <a:p>
             <a:fld id="{339AEEC4-EBDD-4E8B-BA79-466827A02213}" type="datetimeFigureOut">
               <a:rPr lang="de-DE" smtClean="0"/>
-              <a:t>26.05.2015</a:t>
+              <a:t>27.05.2015</a:t>
             </a:fld>
             <a:endParaRPr lang="de-DE"/>
           </a:p>
@@ -3975,46 +3975,6 @@
           </a:p>
         </p:txBody>
       </p:sp>
-      <p:pic>
-        <p:nvPicPr>
-          <p:cNvPr id="18" name="Grafik 17"/>
-          <p:cNvPicPr>
-            <a:picLocks noChangeAspect="1"/>
-          </p:cNvPicPr>
-          <p:nvPr/>
-        </p:nvPicPr>
-        <p:blipFill>
-          <a:blip r:embed="rId9">
-            <a:extLst>
-              <a:ext uri="{28A0092B-C50C-407E-A947-70E740481C1C}">
-                <a14:useLocalDpi xmlns:a14="http://schemas.microsoft.com/office/drawing/2010/main" val="0"/>
-              </a:ext>
-            </a:extLst>
-          </a:blip>
-          <a:stretch>
-            <a:fillRect/>
-          </a:stretch>
-        </p:blipFill>
-        <p:spPr>
-          <a:xfrm>
-            <a:off x="949623" y="2994192"/>
-            <a:ext cx="1740408" cy="2320544"/>
-          </a:xfrm>
-          <a:prstGeom prst="rect">
-            <a:avLst/>
-          </a:prstGeom>
-          <a:ln>
-            <a:noFill/>
-          </a:ln>
-          <a:effectLst>
-            <a:outerShdw blurRad="190500" algn="tl" rotWithShape="0">
-              <a:srgbClr val="000000">
-                <a:alpha val="70000"/>
-              </a:srgbClr>
-            </a:outerShdw>
-          </a:effectLst>
-        </p:spPr>
-      </p:pic>
       <p:sp>
         <p:nvSpPr>
           <p:cNvPr id="19" name="Textfeld 18"/>

</xml_diff>